<commit_message>
Update add part Problematique
</commit_message>
<xml_diff>
--- a/Projet libre Presentation.pptx
+++ b/Projet libre Presentation.pptx
@@ -7,10 +7,11 @@
   <p:sldIdLst>
     <p:sldId id="256" r:id="rId2"/>
     <p:sldId id="260" r:id="rId3"/>
-    <p:sldId id="257" r:id="rId4"/>
-    <p:sldId id="259" r:id="rId5"/>
-    <p:sldId id="258" r:id="rId6"/>
-    <p:sldId id="261" r:id="rId7"/>
+    <p:sldId id="262" r:id="rId4"/>
+    <p:sldId id="257" r:id="rId5"/>
+    <p:sldId id="259" r:id="rId6"/>
+    <p:sldId id="258" r:id="rId7"/>
+    <p:sldId id="261" r:id="rId8"/>
   </p:sldIdLst>
   <p:sldSz cx="12192000" cy="6858000"/>
   <p:notesSz cx="6858000" cy="9144000"/>
@@ -109,6 +110,11 @@
       </a:defRPr>
     </a:lvl9pPr>
   </p:defaultTextStyle>
+  <p:extLst>
+    <p:ext uri="{EFAFB233-063F-42B5-8137-9DF3F51BA10A}">
+      <p15:sldGuideLst xmlns:p15="http://schemas.microsoft.com/office/powerpoint/2012/main"/>
+    </p:ext>
+  </p:extLst>
 </p:presentation>
 </file>
 
@@ -2480,10 +2486,10 @@
         <a:lstStyle/>
         <a:p>
           <a:r>
-            <a:rPr lang="fr-FR"/>
-            <a:t>Le but du projet</a:t>
+            <a:rPr lang="fr-FR" dirty="0"/>
+            <a:t>Problématique</a:t>
           </a:r>
-          <a:endParaRPr lang="en-US"/>
+          <a:endParaRPr lang="en-US" dirty="0"/>
         </a:p>
       </dgm:t>
     </dgm:pt>
@@ -2499,7 +2505,7 @@
       </dgm:t>
     </dgm:pt>
     <dgm:pt modelId="{4C34B73E-33C3-4D69-A6FA-52F972EB2C52}" type="sibTrans" cxnId="{41C890DF-B8D1-4E77-AE13-A8818AB8F3A7}">
-      <dgm:prSet phldrT="01"/>
+      <dgm:prSet phldrT="01" phldr="0"/>
       <dgm:spPr/>
       <dgm:t>
         <a:bodyPr/>
@@ -2521,7 +2527,7 @@
         <a:p>
           <a:r>
             <a:rPr lang="fr-FR" dirty="0"/>
-            <a:t>Ambitions</a:t>
+            <a:t>Le but du projet</a:t>
           </a:r>
           <a:endParaRPr lang="en-US" dirty="0"/>
         </a:p>
@@ -2539,7 +2545,7 @@
       </dgm:t>
     </dgm:pt>
     <dgm:pt modelId="{224BE7DB-F22C-4891-94DE-74F7C2FDAAEA}" type="sibTrans" cxnId="{E37D4B30-6781-4580-9E1B-5190CB28C9D0}">
-      <dgm:prSet phldrT="02"/>
+      <dgm:prSet phldrT="02" phldr="0"/>
       <dgm:spPr/>
       <dgm:t>
         <a:bodyPr/>
@@ -2560,10 +2566,10 @@
         <a:lstStyle/>
         <a:p>
           <a:r>
-            <a:rPr lang="fr-FR"/>
-            <a:t>Les technologies utilisées</a:t>
+            <a:rPr lang="fr-FR" dirty="0"/>
+            <a:t>Ambitions</a:t>
           </a:r>
-          <a:endParaRPr lang="en-US"/>
+          <a:endParaRPr lang="en-US" dirty="0"/>
         </a:p>
       </dgm:t>
     </dgm:pt>
@@ -2579,7 +2585,7 @@
       </dgm:t>
     </dgm:pt>
     <dgm:pt modelId="{9B5FCC2E-4EA7-45B7-A292-A5197B5377FA}" type="sibTrans" cxnId="{AC918617-3D3F-4E31-8780-7D814FDF5858}">
-      <dgm:prSet phldrT="03"/>
+      <dgm:prSet phldrT="03" phldr="0"/>
       <dgm:spPr/>
       <dgm:t>
         <a:bodyPr/>
@@ -2588,6 +2594,46 @@
           <a:r>
             <a:rPr lang="en-US"/>
             <a:t>03</a:t>
+          </a:r>
+        </a:p>
+      </dgm:t>
+    </dgm:pt>
+    <dgm:pt modelId="{B64E5391-2BE1-4304-8551-982B03D9F5E7}">
+      <dgm:prSet/>
+      <dgm:spPr/>
+      <dgm:t>
+        <a:bodyPr/>
+        <a:lstStyle/>
+        <a:p>
+          <a:r>
+            <a:rPr lang="fr-FR" dirty="0"/>
+            <a:t>Les technologies utilisées</a:t>
+          </a:r>
+          <a:endParaRPr lang="en-US" dirty="0"/>
+        </a:p>
+      </dgm:t>
+    </dgm:pt>
+    <dgm:pt modelId="{659C1F4A-F080-423C-85B8-3BC6D4745148}" type="parTrans" cxnId="{C17E1BB1-43E0-4BF7-B184-7798D04896EA}">
+      <dgm:prSet/>
+      <dgm:spPr/>
+      <dgm:t>
+        <a:bodyPr/>
+        <a:lstStyle/>
+        <a:p>
+          <a:endParaRPr lang="en-US"/>
+        </a:p>
+      </dgm:t>
+    </dgm:pt>
+    <dgm:pt modelId="{92A205B9-B310-4E22-924C-5573025D082B}" type="sibTrans" cxnId="{C17E1BB1-43E0-4BF7-B184-7798D04896EA}">
+      <dgm:prSet phldrT="04" phldr="0"/>
+      <dgm:spPr/>
+      <dgm:t>
+        <a:bodyPr/>
+        <a:lstStyle/>
+        <a:p>
+          <a:r>
+            <a:rPr lang="en-US"/>
+            <a:t>04</a:t>
           </a:r>
         </a:p>
       </dgm:t>
@@ -2610,11 +2656,11 @@
       <dgm:spPr/>
     </dgm:pt>
     <dgm:pt modelId="{E53E286A-28F2-4A33-BAAA-223852175E67}" type="pres">
-      <dgm:prSet presAssocID="{A2CF2E8E-779D-46FA-9386-1A51EDE2C26D}" presName="bgRect" presStyleLbl="alignNode1" presStyleIdx="0" presStyleCnt="3"/>
+      <dgm:prSet presAssocID="{A2CF2E8E-779D-46FA-9386-1A51EDE2C26D}" presName="bgRect" presStyleLbl="alignNode1" presStyleIdx="0" presStyleCnt="4"/>
       <dgm:spPr/>
     </dgm:pt>
     <dgm:pt modelId="{3B0FEE3E-099D-4B88-8EE1-FE13D2C9092B}" type="pres">
-      <dgm:prSet presAssocID="{4C34B73E-33C3-4D69-A6FA-52F972EB2C52}" presName="sibTransNodeRect" presStyleLbl="alignNode1" presStyleIdx="0" presStyleCnt="3">
+      <dgm:prSet presAssocID="{4C34B73E-33C3-4D69-A6FA-52F972EB2C52}" presName="sibTransNodeRect" presStyleLbl="alignNode1" presStyleIdx="0" presStyleCnt="4">
         <dgm:presLayoutVars>
           <dgm:chMax val="0"/>
           <dgm:bulletEnabled val="1"/>
@@ -2623,7 +2669,7 @@
       <dgm:spPr/>
     </dgm:pt>
     <dgm:pt modelId="{65F325A8-0813-4676-A15D-C74BFDF22B0D}" type="pres">
-      <dgm:prSet presAssocID="{A2CF2E8E-779D-46FA-9386-1A51EDE2C26D}" presName="nodeRect" presStyleLbl="alignNode1" presStyleIdx="0" presStyleCnt="3">
+      <dgm:prSet presAssocID="{A2CF2E8E-779D-46FA-9386-1A51EDE2C26D}" presName="nodeRect" presStyleLbl="alignNode1" presStyleIdx="0" presStyleCnt="4">
         <dgm:presLayoutVars>
           <dgm:bulletEnabled val="1"/>
         </dgm:presLayoutVars>
@@ -2643,11 +2689,11 @@
       <dgm:spPr/>
     </dgm:pt>
     <dgm:pt modelId="{3E7AC014-DB64-4168-AAC0-AB37F5790A23}" type="pres">
-      <dgm:prSet presAssocID="{062A0D43-5645-404E-BB8C-791C76577F22}" presName="bgRect" presStyleLbl="alignNode1" presStyleIdx="1" presStyleCnt="3"/>
+      <dgm:prSet presAssocID="{062A0D43-5645-404E-BB8C-791C76577F22}" presName="bgRect" presStyleLbl="alignNode1" presStyleIdx="1" presStyleCnt="4"/>
       <dgm:spPr/>
     </dgm:pt>
     <dgm:pt modelId="{203AFCAB-4B8E-45A1-A1D8-926F83AE248F}" type="pres">
-      <dgm:prSet presAssocID="{224BE7DB-F22C-4891-94DE-74F7C2FDAAEA}" presName="sibTransNodeRect" presStyleLbl="alignNode1" presStyleIdx="1" presStyleCnt="3">
+      <dgm:prSet presAssocID="{224BE7DB-F22C-4891-94DE-74F7C2FDAAEA}" presName="sibTransNodeRect" presStyleLbl="alignNode1" presStyleIdx="1" presStyleCnt="4">
         <dgm:presLayoutVars>
           <dgm:chMax val="0"/>
           <dgm:bulletEnabled val="1"/>
@@ -2656,7 +2702,7 @@
       <dgm:spPr/>
     </dgm:pt>
     <dgm:pt modelId="{CF5F0BDE-73D8-442A-AF3B-07C748D8091D}" type="pres">
-      <dgm:prSet presAssocID="{062A0D43-5645-404E-BB8C-791C76577F22}" presName="nodeRect" presStyleLbl="alignNode1" presStyleIdx="1" presStyleCnt="3">
+      <dgm:prSet presAssocID="{062A0D43-5645-404E-BB8C-791C76577F22}" presName="nodeRect" presStyleLbl="alignNode1" presStyleIdx="1" presStyleCnt="4">
         <dgm:presLayoutVars>
           <dgm:bulletEnabled val="1"/>
         </dgm:presLayoutVars>
@@ -2676,11 +2722,11 @@
       <dgm:spPr/>
     </dgm:pt>
     <dgm:pt modelId="{626149EB-77BA-4063-A274-74BD7F34B7A0}" type="pres">
-      <dgm:prSet presAssocID="{D257C16C-8A4E-4BCE-BB66-4C356F27C9D3}" presName="bgRect" presStyleLbl="alignNode1" presStyleIdx="2" presStyleCnt="3"/>
+      <dgm:prSet presAssocID="{D257C16C-8A4E-4BCE-BB66-4C356F27C9D3}" presName="bgRect" presStyleLbl="alignNode1" presStyleIdx="2" presStyleCnt="4"/>
       <dgm:spPr/>
     </dgm:pt>
     <dgm:pt modelId="{57142F99-74A4-4A37-9513-598DA6C5EA84}" type="pres">
-      <dgm:prSet presAssocID="{9B5FCC2E-4EA7-45B7-A292-A5197B5377FA}" presName="sibTransNodeRect" presStyleLbl="alignNode1" presStyleIdx="2" presStyleCnt="3">
+      <dgm:prSet presAssocID="{9B5FCC2E-4EA7-45B7-A292-A5197B5377FA}" presName="sibTransNodeRect" presStyleLbl="alignNode1" presStyleIdx="2" presStyleCnt="4">
         <dgm:presLayoutVars>
           <dgm:chMax val="0"/>
           <dgm:bulletEnabled val="1"/>
@@ -2689,7 +2735,40 @@
       <dgm:spPr/>
     </dgm:pt>
     <dgm:pt modelId="{9CB12BC8-F1C9-4274-A0DD-40B7ED0A9A20}" type="pres">
-      <dgm:prSet presAssocID="{D257C16C-8A4E-4BCE-BB66-4C356F27C9D3}" presName="nodeRect" presStyleLbl="alignNode1" presStyleIdx="2" presStyleCnt="3">
+      <dgm:prSet presAssocID="{D257C16C-8A4E-4BCE-BB66-4C356F27C9D3}" presName="nodeRect" presStyleLbl="alignNode1" presStyleIdx="2" presStyleCnt="4">
+        <dgm:presLayoutVars>
+          <dgm:bulletEnabled val="1"/>
+        </dgm:presLayoutVars>
+      </dgm:prSet>
+      <dgm:spPr/>
+    </dgm:pt>
+    <dgm:pt modelId="{FC30B948-23DE-4D67-ADE9-EB7CCC1BB131}" type="pres">
+      <dgm:prSet presAssocID="{9B5FCC2E-4EA7-45B7-A292-A5197B5377FA}" presName="sibTrans" presStyleCnt="0"/>
+      <dgm:spPr/>
+    </dgm:pt>
+    <dgm:pt modelId="{81AD6A2A-F668-4A58-B2EA-96511F7DFCD0}" type="pres">
+      <dgm:prSet presAssocID="{B64E5391-2BE1-4304-8551-982B03D9F5E7}" presName="compositeNode" presStyleCnt="0">
+        <dgm:presLayoutVars>
+          <dgm:bulletEnabled val="1"/>
+        </dgm:presLayoutVars>
+      </dgm:prSet>
+      <dgm:spPr/>
+    </dgm:pt>
+    <dgm:pt modelId="{9C7609BC-E57D-4D65-858A-E7E930A1AB94}" type="pres">
+      <dgm:prSet presAssocID="{B64E5391-2BE1-4304-8551-982B03D9F5E7}" presName="bgRect" presStyleLbl="alignNode1" presStyleIdx="3" presStyleCnt="4"/>
+      <dgm:spPr/>
+    </dgm:pt>
+    <dgm:pt modelId="{67462B6B-DC1F-40DC-8F64-647B76ED03D4}" type="pres">
+      <dgm:prSet presAssocID="{92A205B9-B310-4E22-924C-5573025D082B}" presName="sibTransNodeRect" presStyleLbl="alignNode1" presStyleIdx="3" presStyleCnt="4">
+        <dgm:presLayoutVars>
+          <dgm:chMax val="0"/>
+          <dgm:bulletEnabled val="1"/>
+        </dgm:presLayoutVars>
+      </dgm:prSet>
+      <dgm:spPr/>
+    </dgm:pt>
+    <dgm:pt modelId="{19C2F03B-1A5F-4D76-93C6-A61214D2999C}" type="pres">
+      <dgm:prSet presAssocID="{B64E5391-2BE1-4304-8551-982B03D9F5E7}" presName="nodeRect" presStyleLbl="alignNode1" presStyleIdx="3" presStyleCnt="4">
         <dgm:presLayoutVars>
           <dgm:bulletEnabled val="1"/>
         </dgm:presLayoutVars>
@@ -2698,13 +2777,17 @@
     </dgm:pt>
   </dgm:ptLst>
   <dgm:cxnLst>
+    <dgm:cxn modelId="{69728912-07CC-4C28-AD08-1D2E6B75026B}" type="presOf" srcId="{B64E5391-2BE1-4304-8551-982B03D9F5E7}" destId="{19C2F03B-1A5F-4D76-93C6-A61214D2999C}" srcOrd="1" destOrd="0" presId="urn:microsoft.com/office/officeart/2016/7/layout/LinearBlockProcessNumbered"/>
     <dgm:cxn modelId="{AC918617-3D3F-4E31-8780-7D814FDF5858}" srcId="{0D58D528-188C-4E8E-B87B-3BB27A7FF838}" destId="{D257C16C-8A4E-4BCE-BB66-4C356F27C9D3}" srcOrd="2" destOrd="0" parTransId="{4C8AEA13-B47F-41E6-AF7B-A9C99D87730B}" sibTransId="{9B5FCC2E-4EA7-45B7-A292-A5197B5377FA}"/>
     <dgm:cxn modelId="{E8DAF529-31C2-4881-A30A-CF64AFC041AB}" type="presOf" srcId="{A2CF2E8E-779D-46FA-9386-1A51EDE2C26D}" destId="{E53E286A-28F2-4A33-BAAA-223852175E67}" srcOrd="0" destOrd="0" presId="urn:microsoft.com/office/officeart/2016/7/layout/LinearBlockProcessNumbered"/>
     <dgm:cxn modelId="{E37D4B30-6781-4580-9E1B-5190CB28C9D0}" srcId="{0D58D528-188C-4E8E-B87B-3BB27A7FF838}" destId="{062A0D43-5645-404E-BB8C-791C76577F22}" srcOrd="1" destOrd="0" parTransId="{10C8F86C-2727-4840-A36A-4917D3172FB6}" sibTransId="{224BE7DB-F22C-4891-94DE-74F7C2FDAAEA}"/>
     <dgm:cxn modelId="{75AE5E3C-1272-4CBB-9FCF-C32ED2A4863C}" type="presOf" srcId="{A2CF2E8E-779D-46FA-9386-1A51EDE2C26D}" destId="{65F325A8-0813-4676-A15D-C74BFDF22B0D}" srcOrd="1" destOrd="0" presId="urn:microsoft.com/office/officeart/2016/7/layout/LinearBlockProcessNumbered"/>
     <dgm:cxn modelId="{99FEE65C-F853-4A19-8AEE-944850615334}" type="presOf" srcId="{0D58D528-188C-4E8E-B87B-3BB27A7FF838}" destId="{592296A0-5C07-4D00-9375-9660B9EB6E7F}" srcOrd="0" destOrd="0" presId="urn:microsoft.com/office/officeart/2016/7/layout/LinearBlockProcessNumbered"/>
+    <dgm:cxn modelId="{DD674270-3A20-4103-8720-AFE5B02A7FB8}" type="presOf" srcId="{92A205B9-B310-4E22-924C-5573025D082B}" destId="{67462B6B-DC1F-40DC-8F64-647B76ED03D4}" srcOrd="0" destOrd="0" presId="urn:microsoft.com/office/officeart/2016/7/layout/LinearBlockProcessNumbered"/>
     <dgm:cxn modelId="{36F36386-CD94-4375-940E-D3CF8C0A831C}" type="presOf" srcId="{9B5FCC2E-4EA7-45B7-A292-A5197B5377FA}" destId="{57142F99-74A4-4A37-9513-598DA6C5EA84}" srcOrd="0" destOrd="0" presId="urn:microsoft.com/office/officeart/2016/7/layout/LinearBlockProcessNumbered"/>
+    <dgm:cxn modelId="{C17E1BB1-43E0-4BF7-B184-7798D04896EA}" srcId="{0D58D528-188C-4E8E-B87B-3BB27A7FF838}" destId="{B64E5391-2BE1-4304-8551-982B03D9F5E7}" srcOrd="3" destOrd="0" parTransId="{659C1F4A-F080-423C-85B8-3BC6D4745148}" sibTransId="{92A205B9-B310-4E22-924C-5573025D082B}"/>
     <dgm:cxn modelId="{7C9294BC-A497-48E2-82E5-719EEBA9F202}" type="presOf" srcId="{224BE7DB-F22C-4891-94DE-74F7C2FDAAEA}" destId="{203AFCAB-4B8E-45A1-A1D8-926F83AE248F}" srcOrd="0" destOrd="0" presId="urn:microsoft.com/office/officeart/2016/7/layout/LinearBlockProcessNumbered"/>
+    <dgm:cxn modelId="{F7AD2BBF-DD08-415E-B004-A134FFA11619}" type="presOf" srcId="{B64E5391-2BE1-4304-8551-982B03D9F5E7}" destId="{9C7609BC-E57D-4D65-858A-E7E930A1AB94}" srcOrd="0" destOrd="0" presId="urn:microsoft.com/office/officeart/2016/7/layout/LinearBlockProcessNumbered"/>
     <dgm:cxn modelId="{3F5CA6CD-2C18-4437-9A64-D9AF5C4DDF61}" type="presOf" srcId="{D257C16C-8A4E-4BCE-BB66-4C356F27C9D3}" destId="{626149EB-77BA-4063-A274-74BD7F34B7A0}" srcOrd="0" destOrd="0" presId="urn:microsoft.com/office/officeart/2016/7/layout/LinearBlockProcessNumbered"/>
     <dgm:cxn modelId="{766ABAD7-9564-43DE-A6B4-C2D143BB56FF}" type="presOf" srcId="{062A0D43-5645-404E-BB8C-791C76577F22}" destId="{3E7AC014-DB64-4168-AAC0-AB37F5790A23}" srcOrd="0" destOrd="0" presId="urn:microsoft.com/office/officeart/2016/7/layout/LinearBlockProcessNumbered"/>
     <dgm:cxn modelId="{1779B2DA-401B-4F6E-97F4-D5091EB14031}" type="presOf" srcId="{D257C16C-8A4E-4BCE-BB66-4C356F27C9D3}" destId="{9CB12BC8-F1C9-4274-A0DD-40B7ED0A9A20}" srcOrd="1" destOrd="0" presId="urn:microsoft.com/office/officeart/2016/7/layout/LinearBlockProcessNumbered"/>
@@ -2725,6 +2808,11 @@
     <dgm:cxn modelId="{4121AC9A-5EDD-4844-B657-217F87924F4C}" type="presParOf" srcId="{03C3C43E-89A1-4C1B-BFDE-8FAE5373428B}" destId="{626149EB-77BA-4063-A274-74BD7F34B7A0}" srcOrd="0" destOrd="0" presId="urn:microsoft.com/office/officeart/2016/7/layout/LinearBlockProcessNumbered"/>
     <dgm:cxn modelId="{1DB4D05B-5A1D-4465-AA4E-6740CB47EC5E}" type="presParOf" srcId="{03C3C43E-89A1-4C1B-BFDE-8FAE5373428B}" destId="{57142F99-74A4-4A37-9513-598DA6C5EA84}" srcOrd="1" destOrd="0" presId="urn:microsoft.com/office/officeart/2016/7/layout/LinearBlockProcessNumbered"/>
     <dgm:cxn modelId="{F3C9F5C1-6C76-4FBB-A1A3-463B9A04D427}" type="presParOf" srcId="{03C3C43E-89A1-4C1B-BFDE-8FAE5373428B}" destId="{9CB12BC8-F1C9-4274-A0DD-40B7ED0A9A20}" srcOrd="2" destOrd="0" presId="urn:microsoft.com/office/officeart/2016/7/layout/LinearBlockProcessNumbered"/>
+    <dgm:cxn modelId="{F5284CB1-B768-4671-8408-9B5C108C2BC0}" type="presParOf" srcId="{592296A0-5C07-4D00-9375-9660B9EB6E7F}" destId="{FC30B948-23DE-4D67-ADE9-EB7CCC1BB131}" srcOrd="5" destOrd="0" presId="urn:microsoft.com/office/officeart/2016/7/layout/LinearBlockProcessNumbered"/>
+    <dgm:cxn modelId="{3D39065D-A50B-4A65-842F-5C7F63D7CBF5}" type="presParOf" srcId="{592296A0-5C07-4D00-9375-9660B9EB6E7F}" destId="{81AD6A2A-F668-4A58-B2EA-96511F7DFCD0}" srcOrd="6" destOrd="0" presId="urn:microsoft.com/office/officeart/2016/7/layout/LinearBlockProcessNumbered"/>
+    <dgm:cxn modelId="{89A00412-C8F8-44FC-A351-8C69A14C4328}" type="presParOf" srcId="{81AD6A2A-F668-4A58-B2EA-96511F7DFCD0}" destId="{9C7609BC-E57D-4D65-858A-E7E930A1AB94}" srcOrd="0" destOrd="0" presId="urn:microsoft.com/office/officeart/2016/7/layout/LinearBlockProcessNumbered"/>
+    <dgm:cxn modelId="{FBE6C6E6-A746-4B36-940A-1BFE331C0503}" type="presParOf" srcId="{81AD6A2A-F668-4A58-B2EA-96511F7DFCD0}" destId="{67462B6B-DC1F-40DC-8F64-647B76ED03D4}" srcOrd="1" destOrd="0" presId="urn:microsoft.com/office/officeart/2016/7/layout/LinearBlockProcessNumbered"/>
+    <dgm:cxn modelId="{3CA0300A-1A0B-4903-B075-63E039FB4F69}" type="presParOf" srcId="{81AD6A2A-F668-4A58-B2EA-96511F7DFCD0}" destId="{19C2F03B-1A5F-4D76-93C6-A61214D2999C}" srcOrd="2" destOrd="0" presId="urn:microsoft.com/office/officeart/2016/7/layout/LinearBlockProcessNumbered"/>
   </dgm:cxnLst>
   <dgm:bg/>
   <dgm:whole/>
@@ -3330,8 +3418,8 @@
       </dsp:nvSpPr>
       <dsp:spPr>
         <a:xfrm>
-          <a:off x="770" y="0"/>
-          <a:ext cx="3122549" cy="3603615"/>
+          <a:off x="192" y="405333"/>
+          <a:ext cx="2327456" cy="2792947"/>
         </a:xfrm>
         <a:prstGeom prst="rect">
           <a:avLst/>
@@ -3372,12 +3460,12 @@
         </a:fontRef>
       </dsp:style>
       <dsp:txBody>
-        <a:bodyPr spcFirstLastPara="0" vert="horz" wrap="square" lIns="308439" tIns="0" rIns="308439" bIns="330200" numCol="1" spcCol="1270" anchor="t" anchorCtr="0">
+        <a:bodyPr spcFirstLastPara="0" vert="horz" wrap="square" lIns="229901" tIns="0" rIns="229901" bIns="330200" numCol="1" spcCol="1270" anchor="t" anchorCtr="0">
           <a:noAutofit/>
         </a:bodyPr>
         <a:lstStyle/>
         <a:p>
-          <a:pPr marL="0" lvl="0" indent="0" algn="l" defTabSz="1155700">
+          <a:pPr marL="0" lvl="0" indent="0" algn="l" defTabSz="977900">
             <a:lnSpc>
               <a:spcPct val="90000"/>
             </a:lnSpc>
@@ -3390,15 +3478,15 @@
             <a:buNone/>
           </a:pPr>
           <a:r>
-            <a:rPr lang="fr-FR" sz="2600" kern="1200"/>
-            <a:t>Le but du projet</a:t>
+            <a:rPr lang="fr-FR" sz="2200" kern="1200" dirty="0"/>
+            <a:t>Problématique</a:t>
           </a:r>
-          <a:endParaRPr lang="en-US" sz="2600" kern="1200"/>
+          <a:endParaRPr lang="en-US" sz="2200" kern="1200" dirty="0"/>
         </a:p>
       </dsp:txBody>
       <dsp:txXfrm>
-        <a:off x="770" y="1441446"/>
-        <a:ext cx="3122549" cy="2162169"/>
+        <a:off x="192" y="1522512"/>
+        <a:ext cx="2327456" cy="1675768"/>
       </dsp:txXfrm>
     </dsp:sp>
     <dsp:sp modelId="{3B0FEE3E-099D-4B88-8EE1-FE13D2C9092B}">
@@ -3408,8 +3496,8 @@
       </dsp:nvSpPr>
       <dsp:spPr>
         <a:xfrm>
-          <a:off x="770" y="0"/>
-          <a:ext cx="3122549" cy="1441446"/>
+          <a:off x="192" y="405333"/>
+          <a:ext cx="2327456" cy="1117178"/>
         </a:xfrm>
         <a:prstGeom prst="rect">
           <a:avLst/>
@@ -3437,12 +3525,12 @@
         </a:fontRef>
       </dsp:style>
       <dsp:txBody>
-        <a:bodyPr spcFirstLastPara="0" vert="horz" wrap="square" lIns="308439" tIns="165100" rIns="308439" bIns="165100" numCol="1" spcCol="1270" anchor="ctr" anchorCtr="0">
+        <a:bodyPr spcFirstLastPara="0" vert="horz" wrap="square" lIns="229901" tIns="165100" rIns="229901" bIns="165100" numCol="1" spcCol="1270" anchor="ctr" anchorCtr="0">
           <a:noAutofit/>
         </a:bodyPr>
         <a:lstStyle/>
         <a:p>
-          <a:pPr marL="0" lvl="0" indent="0" algn="l" defTabSz="2933700">
+          <a:pPr marL="0" lvl="0" indent="0" algn="l" defTabSz="2622550">
             <a:lnSpc>
               <a:spcPct val="90000"/>
             </a:lnSpc>
@@ -3455,14 +3543,14 @@
             <a:buNone/>
           </a:pPr>
           <a:r>
-            <a:rPr lang="en-US" sz="6600" kern="1200"/>
+            <a:rPr lang="en-US" sz="5900" kern="1200"/>
             <a:t>01</a:t>
           </a:r>
         </a:p>
       </dsp:txBody>
       <dsp:txXfrm>
-        <a:off x="770" y="0"/>
-        <a:ext cx="3122549" cy="1441446"/>
+        <a:off x="192" y="405333"/>
+        <a:ext cx="2327456" cy="1117178"/>
       </dsp:txXfrm>
     </dsp:sp>
     <dsp:sp modelId="{3E7AC014-DB64-4168-AAC0-AB37F5790A23}">
@@ -3472,26 +3560,26 @@
       </dsp:nvSpPr>
       <dsp:spPr>
         <a:xfrm>
-          <a:off x="3373124" y="0"/>
-          <a:ext cx="3122549" cy="3603615"/>
+          <a:off x="2513845" y="405333"/>
+          <a:ext cx="2327456" cy="2792947"/>
         </a:xfrm>
         <a:prstGeom prst="rect">
           <a:avLst/>
         </a:prstGeom>
         <a:solidFill>
           <a:schemeClr val="accent2">
-            <a:hueOff val="-6335275"/>
-            <a:satOff val="-15101"/>
-            <a:lumOff val="-6961"/>
+            <a:hueOff val="-4223517"/>
+            <a:satOff val="-10068"/>
+            <a:lumOff val="-4641"/>
             <a:alphaOff val="0"/>
           </a:schemeClr>
         </a:solidFill>
         <a:ln w="15875" cap="flat" cmpd="sng" algn="ctr">
           <a:solidFill>
             <a:schemeClr val="accent2">
-              <a:hueOff val="-6335275"/>
-              <a:satOff val="-15101"/>
-              <a:lumOff val="-6961"/>
+              <a:hueOff val="-4223517"/>
+              <a:satOff val="-10068"/>
+              <a:lumOff val="-4641"/>
               <a:alphaOff val="0"/>
             </a:schemeClr>
           </a:solidFill>
@@ -3514,12 +3602,12 @@
         </a:fontRef>
       </dsp:style>
       <dsp:txBody>
-        <a:bodyPr spcFirstLastPara="0" vert="horz" wrap="square" lIns="308439" tIns="0" rIns="308439" bIns="330200" numCol="1" spcCol="1270" anchor="t" anchorCtr="0">
+        <a:bodyPr spcFirstLastPara="0" vert="horz" wrap="square" lIns="229901" tIns="0" rIns="229901" bIns="330200" numCol="1" spcCol="1270" anchor="t" anchorCtr="0">
           <a:noAutofit/>
         </a:bodyPr>
         <a:lstStyle/>
         <a:p>
-          <a:pPr marL="0" lvl="0" indent="0" algn="l" defTabSz="1155700">
+          <a:pPr marL="0" lvl="0" indent="0" algn="l" defTabSz="977900">
             <a:lnSpc>
               <a:spcPct val="90000"/>
             </a:lnSpc>
@@ -3532,15 +3620,15 @@
             <a:buNone/>
           </a:pPr>
           <a:r>
-            <a:rPr lang="fr-FR" sz="2600" kern="1200" dirty="0"/>
-            <a:t>Ambitions</a:t>
+            <a:rPr lang="fr-FR" sz="2200" kern="1200" dirty="0"/>
+            <a:t>Le but du projet</a:t>
           </a:r>
-          <a:endParaRPr lang="en-US" sz="2600" kern="1200" dirty="0"/>
+          <a:endParaRPr lang="en-US" sz="2200" kern="1200" dirty="0"/>
         </a:p>
       </dsp:txBody>
       <dsp:txXfrm>
-        <a:off x="3373124" y="1441446"/>
-        <a:ext cx="3122549" cy="2162169"/>
+        <a:off x="2513845" y="1522512"/>
+        <a:ext cx="2327456" cy="1675768"/>
       </dsp:txXfrm>
     </dsp:sp>
     <dsp:sp modelId="{203AFCAB-4B8E-45A1-A1D8-926F83AE248F}">
@@ -3550,8 +3638,8 @@
       </dsp:nvSpPr>
       <dsp:spPr>
         <a:xfrm>
-          <a:off x="3373124" y="0"/>
-          <a:ext cx="3122549" cy="1441446"/>
+          <a:off x="2513845" y="405333"/>
+          <a:ext cx="2327456" cy="1117178"/>
         </a:xfrm>
         <a:prstGeom prst="rect">
           <a:avLst/>
@@ -3579,12 +3667,12 @@
         </a:fontRef>
       </dsp:style>
       <dsp:txBody>
-        <a:bodyPr spcFirstLastPara="0" vert="horz" wrap="square" lIns="308439" tIns="165100" rIns="308439" bIns="165100" numCol="1" spcCol="1270" anchor="ctr" anchorCtr="0">
+        <a:bodyPr spcFirstLastPara="0" vert="horz" wrap="square" lIns="229901" tIns="165100" rIns="229901" bIns="165100" numCol="1" spcCol="1270" anchor="ctr" anchorCtr="0">
           <a:noAutofit/>
         </a:bodyPr>
         <a:lstStyle/>
         <a:p>
-          <a:pPr marL="0" lvl="0" indent="0" algn="l" defTabSz="2933700">
+          <a:pPr marL="0" lvl="0" indent="0" algn="l" defTabSz="2622550">
             <a:lnSpc>
               <a:spcPct val="90000"/>
             </a:lnSpc>
@@ -3597,14 +3685,14 @@
             <a:buNone/>
           </a:pPr>
           <a:r>
-            <a:rPr lang="en-US" sz="6600" kern="1200"/>
+            <a:rPr lang="en-US" sz="5900" kern="1200"/>
             <a:t>02</a:t>
           </a:r>
         </a:p>
       </dsp:txBody>
       <dsp:txXfrm>
-        <a:off x="3373124" y="0"/>
-        <a:ext cx="3122549" cy="1441446"/>
+        <a:off x="2513845" y="405333"/>
+        <a:ext cx="2327456" cy="1117178"/>
       </dsp:txXfrm>
     </dsp:sp>
     <dsp:sp modelId="{626149EB-77BA-4063-A274-74BD7F34B7A0}">
@@ -3614,8 +3702,150 @@
       </dsp:nvSpPr>
       <dsp:spPr>
         <a:xfrm>
-          <a:off x="6745478" y="0"/>
-          <a:ext cx="3122549" cy="3603615"/>
+          <a:off x="5027497" y="405333"/>
+          <a:ext cx="2327456" cy="2792947"/>
+        </a:xfrm>
+        <a:prstGeom prst="rect">
+          <a:avLst/>
+        </a:prstGeom>
+        <a:solidFill>
+          <a:schemeClr val="accent2">
+            <a:hueOff val="-8447033"/>
+            <a:satOff val="-20135"/>
+            <a:lumOff val="-9281"/>
+            <a:alphaOff val="0"/>
+          </a:schemeClr>
+        </a:solidFill>
+        <a:ln w="15875" cap="flat" cmpd="sng" algn="ctr">
+          <a:solidFill>
+            <a:schemeClr val="accent2">
+              <a:hueOff val="-8447033"/>
+              <a:satOff val="-20135"/>
+              <a:lumOff val="-9281"/>
+              <a:alphaOff val="0"/>
+            </a:schemeClr>
+          </a:solidFill>
+          <a:prstDash val="solid"/>
+        </a:ln>
+        <a:effectLst/>
+      </dsp:spPr>
+      <dsp:style>
+        <a:lnRef idx="2">
+          <a:scrgbClr r="0" g="0" b="0"/>
+        </a:lnRef>
+        <a:fillRef idx="1">
+          <a:scrgbClr r="0" g="0" b="0"/>
+        </a:fillRef>
+        <a:effectRef idx="0">
+          <a:scrgbClr r="0" g="0" b="0"/>
+        </a:effectRef>
+        <a:fontRef idx="minor">
+          <a:schemeClr val="lt1"/>
+        </a:fontRef>
+      </dsp:style>
+      <dsp:txBody>
+        <a:bodyPr spcFirstLastPara="0" vert="horz" wrap="square" lIns="229901" tIns="0" rIns="229901" bIns="330200" numCol="1" spcCol="1270" anchor="t" anchorCtr="0">
+          <a:noAutofit/>
+        </a:bodyPr>
+        <a:lstStyle/>
+        <a:p>
+          <a:pPr marL="0" lvl="0" indent="0" algn="l" defTabSz="977900">
+            <a:lnSpc>
+              <a:spcPct val="90000"/>
+            </a:lnSpc>
+            <a:spcBef>
+              <a:spcPct val="0"/>
+            </a:spcBef>
+            <a:spcAft>
+              <a:spcPct val="35000"/>
+            </a:spcAft>
+            <a:buNone/>
+          </a:pPr>
+          <a:r>
+            <a:rPr lang="fr-FR" sz="2200" kern="1200" dirty="0"/>
+            <a:t>Ambitions</a:t>
+          </a:r>
+          <a:endParaRPr lang="en-US" sz="2200" kern="1200" dirty="0"/>
+        </a:p>
+      </dsp:txBody>
+      <dsp:txXfrm>
+        <a:off x="5027497" y="1522512"/>
+        <a:ext cx="2327456" cy="1675768"/>
+      </dsp:txXfrm>
+    </dsp:sp>
+    <dsp:sp modelId="{57142F99-74A4-4A37-9513-598DA6C5EA84}">
+      <dsp:nvSpPr>
+        <dsp:cNvPr id="0" name=""/>
+        <dsp:cNvSpPr/>
+      </dsp:nvSpPr>
+      <dsp:spPr>
+        <a:xfrm>
+          <a:off x="5027497" y="405333"/>
+          <a:ext cx="2327456" cy="1117178"/>
+        </a:xfrm>
+        <a:prstGeom prst="rect">
+          <a:avLst/>
+        </a:prstGeom>
+        <a:noFill/>
+        <a:ln w="15875" cap="flat" cmpd="sng" algn="ctr">
+          <a:noFill/>
+          <a:prstDash val="solid"/>
+        </a:ln>
+        <a:effectLst/>
+        <a:sp3d/>
+      </dsp:spPr>
+      <dsp:style>
+        <a:lnRef idx="2">
+          <a:scrgbClr r="0" g="0" b="0"/>
+        </a:lnRef>
+        <a:fillRef idx="1">
+          <a:scrgbClr r="0" g="0" b="0"/>
+        </a:fillRef>
+        <a:effectRef idx="0">
+          <a:scrgbClr r="0" g="0" b="0"/>
+        </a:effectRef>
+        <a:fontRef idx="minor">
+          <a:schemeClr val="lt1"/>
+        </a:fontRef>
+      </dsp:style>
+      <dsp:txBody>
+        <a:bodyPr spcFirstLastPara="0" vert="horz" wrap="square" lIns="229901" tIns="165100" rIns="229901" bIns="165100" numCol="1" spcCol="1270" anchor="ctr" anchorCtr="0">
+          <a:noAutofit/>
+        </a:bodyPr>
+        <a:lstStyle/>
+        <a:p>
+          <a:pPr marL="0" lvl="0" indent="0" algn="l" defTabSz="2622550">
+            <a:lnSpc>
+              <a:spcPct val="90000"/>
+            </a:lnSpc>
+            <a:spcBef>
+              <a:spcPct val="0"/>
+            </a:spcBef>
+            <a:spcAft>
+              <a:spcPct val="35000"/>
+            </a:spcAft>
+            <a:buNone/>
+          </a:pPr>
+          <a:r>
+            <a:rPr lang="en-US" sz="5900" kern="1200"/>
+            <a:t>03</a:t>
+          </a:r>
+        </a:p>
+      </dsp:txBody>
+      <dsp:txXfrm>
+        <a:off x="5027497" y="405333"/>
+        <a:ext cx="2327456" cy="1117178"/>
+      </dsp:txXfrm>
+    </dsp:sp>
+    <dsp:sp modelId="{9C7609BC-E57D-4D65-858A-E7E930A1AB94}">
+      <dsp:nvSpPr>
+        <dsp:cNvPr id="0" name=""/>
+        <dsp:cNvSpPr/>
+      </dsp:nvSpPr>
+      <dsp:spPr>
+        <a:xfrm>
+          <a:off x="7541150" y="405333"/>
+          <a:ext cx="2327456" cy="2792947"/>
         </a:xfrm>
         <a:prstGeom prst="rect">
           <a:avLst/>
@@ -3656,12 +3886,12 @@
         </a:fontRef>
       </dsp:style>
       <dsp:txBody>
-        <a:bodyPr spcFirstLastPara="0" vert="horz" wrap="square" lIns="308439" tIns="0" rIns="308439" bIns="330200" numCol="1" spcCol="1270" anchor="t" anchorCtr="0">
+        <a:bodyPr spcFirstLastPara="0" vert="horz" wrap="square" lIns="229901" tIns="0" rIns="229901" bIns="330200" numCol="1" spcCol="1270" anchor="t" anchorCtr="0">
           <a:noAutofit/>
         </a:bodyPr>
         <a:lstStyle/>
         <a:p>
-          <a:pPr marL="0" lvl="0" indent="0" algn="l" defTabSz="1155700">
+          <a:pPr marL="0" lvl="0" indent="0" algn="l" defTabSz="977900">
             <a:lnSpc>
               <a:spcPct val="90000"/>
             </a:lnSpc>
@@ -3674,26 +3904,26 @@
             <a:buNone/>
           </a:pPr>
           <a:r>
-            <a:rPr lang="fr-FR" sz="2600" kern="1200"/>
+            <a:rPr lang="fr-FR" sz="2200" kern="1200" dirty="0"/>
             <a:t>Les technologies utilisées</a:t>
           </a:r>
-          <a:endParaRPr lang="en-US" sz="2600" kern="1200"/>
+          <a:endParaRPr lang="en-US" sz="2200" kern="1200" dirty="0"/>
         </a:p>
       </dsp:txBody>
       <dsp:txXfrm>
-        <a:off x="6745478" y="1441446"/>
-        <a:ext cx="3122549" cy="2162169"/>
+        <a:off x="7541150" y="1522512"/>
+        <a:ext cx="2327456" cy="1675768"/>
       </dsp:txXfrm>
     </dsp:sp>
-    <dsp:sp modelId="{57142F99-74A4-4A37-9513-598DA6C5EA84}">
+    <dsp:sp modelId="{67462B6B-DC1F-40DC-8F64-647B76ED03D4}">
       <dsp:nvSpPr>
         <dsp:cNvPr id="0" name=""/>
         <dsp:cNvSpPr/>
       </dsp:nvSpPr>
       <dsp:spPr>
         <a:xfrm>
-          <a:off x="6745478" y="0"/>
-          <a:ext cx="3122549" cy="1441446"/>
+          <a:off x="7541150" y="405333"/>
+          <a:ext cx="2327456" cy="1117178"/>
         </a:xfrm>
         <a:prstGeom prst="rect">
           <a:avLst/>
@@ -3721,12 +3951,12 @@
         </a:fontRef>
       </dsp:style>
       <dsp:txBody>
-        <a:bodyPr spcFirstLastPara="0" vert="horz" wrap="square" lIns="308439" tIns="165100" rIns="308439" bIns="165100" numCol="1" spcCol="1270" anchor="ctr" anchorCtr="0">
+        <a:bodyPr spcFirstLastPara="0" vert="horz" wrap="square" lIns="229901" tIns="165100" rIns="229901" bIns="165100" numCol="1" spcCol="1270" anchor="ctr" anchorCtr="0">
           <a:noAutofit/>
         </a:bodyPr>
         <a:lstStyle/>
         <a:p>
-          <a:pPr marL="0" lvl="0" indent="0" algn="l" defTabSz="2933700">
+          <a:pPr marL="0" lvl="0" indent="0" algn="l" defTabSz="2622550">
             <a:lnSpc>
               <a:spcPct val="90000"/>
             </a:lnSpc>
@@ -3739,14 +3969,14 @@
             <a:buNone/>
           </a:pPr>
           <a:r>
-            <a:rPr lang="en-US" sz="6600" kern="1200"/>
-            <a:t>03</a:t>
+            <a:rPr lang="en-US" sz="5900" kern="1200"/>
+            <a:t>04</a:t>
           </a:r>
         </a:p>
       </dsp:txBody>
       <dsp:txXfrm>
-        <a:off x="6745478" y="0"/>
-        <a:ext cx="3122549" cy="1441446"/>
+        <a:off x="7541150" y="405333"/>
+        <a:ext cx="2327456" cy="1117178"/>
       </dsp:txXfrm>
     </dsp:sp>
   </dsp:spTree>
@@ -13597,7 +13827,7 @@
             <p:ph idx="1"/>
             <p:extLst>
               <p:ext uri="{D42A27DB-BD31-4B8C-83A1-F6EECF244321}">
-                <p14:modId xmlns:p14="http://schemas.microsoft.com/office/powerpoint/2010/main" val="1783565418"/>
+                <p14:modId xmlns:p14="http://schemas.microsoft.com/office/powerpoint/2010/main" val="693714076"/>
               </p:ext>
             </p:extLst>
           </p:nvPr>
@@ -13626,6 +13856,110 @@
 </file>
 
 <file path=ppt/slides/slide3.xml><?xml version="1.0" encoding="utf-8"?>
+<p:sld xmlns:a="http://schemas.openxmlformats.org/drawingml/2006/main" xmlns:r="http://schemas.openxmlformats.org/officeDocument/2006/relationships" xmlns:p="http://schemas.openxmlformats.org/presentationml/2006/main">
+  <p:cSld>
+    <p:spTree>
+      <p:nvGrpSpPr>
+        <p:cNvPr id="1" name=""/>
+        <p:cNvGrpSpPr/>
+        <p:nvPr/>
+      </p:nvGrpSpPr>
+      <p:grpSpPr>
+        <a:xfrm>
+          <a:off x="0" y="0"/>
+          <a:ext cx="0" cy="0"/>
+          <a:chOff x="0" y="0"/>
+          <a:chExt cx="0" cy="0"/>
+        </a:xfrm>
+      </p:grpSpPr>
+      <p:sp>
+        <p:nvSpPr>
+          <p:cNvPr id="2" name="Titre 1">
+            <a:extLst>
+              <a:ext uri="{FF2B5EF4-FFF2-40B4-BE49-F238E27FC236}">
+                <a16:creationId xmlns:a16="http://schemas.microsoft.com/office/drawing/2014/main" id="{127F70BC-8B5D-44D0-AEB6-65B55B04B5A4}"/>
+              </a:ext>
+            </a:extLst>
+          </p:cNvPr>
+          <p:cNvSpPr>
+            <a:spLocks noGrp="1"/>
+          </p:cNvSpPr>
+          <p:nvPr>
+            <p:ph type="title"/>
+          </p:nvPr>
+        </p:nvSpPr>
+        <p:spPr/>
+        <p:txBody>
+          <a:bodyPr/>
+          <a:lstStyle/>
+          <a:p>
+            <a:r>
+              <a:rPr lang="fr-FR" dirty="0"/>
+              <a:t>Problématique</a:t>
+            </a:r>
+            <a:endParaRPr lang="en-US" dirty="0"/>
+          </a:p>
+        </p:txBody>
+      </p:sp>
+      <p:sp>
+        <p:nvSpPr>
+          <p:cNvPr id="3" name="Espace réservé du contenu 2">
+            <a:extLst>
+              <a:ext uri="{FF2B5EF4-FFF2-40B4-BE49-F238E27FC236}">
+                <a16:creationId xmlns:a16="http://schemas.microsoft.com/office/drawing/2014/main" id="{319F8CD1-E303-4B78-A262-5101798FBF45}"/>
+              </a:ext>
+            </a:extLst>
+          </p:cNvPr>
+          <p:cNvSpPr>
+            <a:spLocks noGrp="1"/>
+          </p:cNvSpPr>
+          <p:nvPr>
+            <p:ph idx="1"/>
+          </p:nvPr>
+        </p:nvSpPr>
+        <p:spPr/>
+        <p:txBody>
+          <a:bodyPr/>
+          <a:lstStyle/>
+          <a:p>
+            <a:r>
+              <a:rPr lang="fr-FR" dirty="0"/>
+              <a:t>Difficulté a gérer les réclamations</a:t>
+            </a:r>
+          </a:p>
+          <a:p>
+            <a:r>
+              <a:rPr lang="fr-FR" dirty="0"/>
+              <a:t>Pas d’endroit concret ou les visualiser facilement</a:t>
+            </a:r>
+          </a:p>
+          <a:p>
+            <a:r>
+              <a:rPr lang="fr-FR" dirty="0"/>
+              <a:t>Centraliser commentaires et </a:t>
+            </a:r>
+            <a:r>
+              <a:rPr lang="fr-FR" dirty="0" err="1"/>
+              <a:t>reclamations</a:t>
+            </a:r>
+            <a:endParaRPr lang="en-US" dirty="0"/>
+          </a:p>
+        </p:txBody>
+      </p:sp>
+    </p:spTree>
+    <p:extLst>
+      <p:ext uri="{BB962C8B-B14F-4D97-AF65-F5344CB8AC3E}">
+        <p14:creationId xmlns:p14="http://schemas.microsoft.com/office/powerpoint/2010/main" val="395309210"/>
+      </p:ext>
+    </p:extLst>
+  </p:cSld>
+  <p:clrMapOvr>
+    <a:masterClrMapping/>
+  </p:clrMapOvr>
+</p:sld>
+</file>
+
+<file path=ppt/slides/slide4.xml><?xml version="1.0" encoding="utf-8"?>
 <p:sld xmlns:a="http://schemas.openxmlformats.org/drawingml/2006/main" xmlns:r="http://schemas.openxmlformats.org/officeDocument/2006/relationships" xmlns:p="http://schemas.openxmlformats.org/presentationml/2006/main">
   <p:cSld>
     <p:bg>
@@ -13734,7 +14068,7 @@
 </p:sld>
 </file>
 
-<file path=ppt/slides/slide4.xml><?xml version="1.0" encoding="utf-8"?>
+<file path=ppt/slides/slide5.xml><?xml version="1.0" encoding="utf-8"?>
 <p:sld xmlns:a="http://schemas.openxmlformats.org/drawingml/2006/main" xmlns:r="http://schemas.openxmlformats.org/officeDocument/2006/relationships" xmlns:p="http://schemas.openxmlformats.org/presentationml/2006/main">
   <p:cSld>
     <p:bg>
@@ -14080,7 +14414,7 @@
 </p:sld>
 </file>
 
-<file path=ppt/slides/slide5.xml><?xml version="1.0" encoding="utf-8"?>
+<file path=ppt/slides/slide6.xml><?xml version="1.0" encoding="utf-8"?>
 <p:sld xmlns:a="http://schemas.openxmlformats.org/drawingml/2006/main" xmlns:r="http://schemas.openxmlformats.org/officeDocument/2006/relationships" xmlns:p="http://schemas.openxmlformats.org/presentationml/2006/main">
   <p:cSld>
     <p:bg>
@@ -15416,7 +15750,7 @@
 </p:sld>
 </file>
 
-<file path=ppt/slides/slide6.xml><?xml version="1.0" encoding="utf-8"?>
+<file path=ppt/slides/slide7.xml><?xml version="1.0" encoding="utf-8"?>
 <p:sld xmlns:a="http://schemas.openxmlformats.org/drawingml/2006/main" xmlns:r="http://schemas.openxmlformats.org/officeDocument/2006/relationships" xmlns:p="http://schemas.openxmlformats.org/presentationml/2006/main">
   <p:cSld>
     <p:bg>

</xml_diff>